<commit_message>
Update COSMIC Full Function Points (FFP).pptx
</commit_message>
<xml_diff>
--- a/COSMIC Full Function Points (FFP).pptx
+++ b/COSMIC Full Function Points (FFP).pptx
@@ -134,18 +134,18 @@
   <pc:docChgLst>
     <pc:chgData name="Mohammad Alquamah Ansari" userId="bfd4326778c51f46" providerId="LiveId" clId="{D1C5638E-DC69-4E73-9727-52F0E7E81CD2}"/>
     <pc:docChg chg="undo custSel modSld">
-      <pc:chgData name="Mohammad Alquamah Ansari" userId="bfd4326778c51f46" providerId="LiveId" clId="{D1C5638E-DC69-4E73-9727-52F0E7E81CD2}" dt="2025-08-04T01:58:42.365" v="26" actId="14100"/>
+      <pc:chgData name="Mohammad Alquamah Ansari" userId="bfd4326778c51f46" providerId="LiveId" clId="{D1C5638E-DC69-4E73-9727-52F0E7E81CD2}" dt="2025-08-04T16:39:12.173" v="27" actId="207"/>
       <pc:docMkLst>
         <pc:docMk/>
       </pc:docMkLst>
       <pc:sldChg chg="modSp mod">
-        <pc:chgData name="Mohammad Alquamah Ansari" userId="bfd4326778c51f46" providerId="LiveId" clId="{D1C5638E-DC69-4E73-9727-52F0E7E81CD2}" dt="2025-08-03T11:47:17.072" v="24" actId="1076"/>
+        <pc:chgData name="Mohammad Alquamah Ansari" userId="bfd4326778c51f46" providerId="LiveId" clId="{D1C5638E-DC69-4E73-9727-52F0E7E81CD2}" dt="2025-08-04T16:39:12.173" v="27" actId="207"/>
         <pc:sldMkLst>
           <pc:docMk/>
           <pc:sldMk cId="1678561360" sldId="256"/>
         </pc:sldMkLst>
         <pc:spChg chg="mod">
-          <ac:chgData name="Mohammad Alquamah Ansari" userId="bfd4326778c51f46" providerId="LiveId" clId="{D1C5638E-DC69-4E73-9727-52F0E7E81CD2}" dt="2025-08-03T11:47:17.072" v="24" actId="1076"/>
+          <ac:chgData name="Mohammad Alquamah Ansari" userId="bfd4326778c51f46" providerId="LiveId" clId="{D1C5638E-DC69-4E73-9727-52F0E7E81CD2}" dt="2025-08-04T16:39:12.173" v="27" actId="207"/>
           <ac:spMkLst>
             <pc:docMk/>
             <pc:sldMk cId="1678561360" sldId="256"/>
@@ -3601,10 +3601,18 @@
               <a:buNone/>
             </a:pPr>
             <a:r>
-              <a:rPr lang="en-IN" sz="2400" b="1" dirty="0"/>
+              <a:rPr lang="en-IN" sz="2400" b="1" dirty="0">
+                <a:solidFill>
+                  <a:srgbClr val="004080"/>
+                </a:solidFill>
+              </a:rPr>
               <a:t>Mohammad Alquamah Ansari</a:t>
             </a:r>
-            <a:endParaRPr lang="en-US" sz="2400" dirty="0"/>
+            <a:endParaRPr lang="en-US" sz="2400" dirty="0">
+              <a:solidFill>
+                <a:srgbClr val="004080"/>
+              </a:solidFill>
+            </a:endParaRPr>
           </a:p>
         </p:txBody>
       </p:sp>

</xml_diff>

<commit_message>
This is my first commit
</commit_message>
<xml_diff>
--- a/COSMIC Full Function Points (FFP).pptx
+++ b/COSMIC Full Function Points (FFP).pptx
@@ -4882,6 +4882,36 @@
           </a:p>
         </p:txBody>
       </p:sp>
+      <p:pic>
+        <p:nvPicPr>
+          <p:cNvPr id="4" name="Picture 3">
+            <a:extLst>
+              <a:ext uri="{FF2B5EF4-FFF2-40B4-BE49-F238E27FC236}">
+                <a16:creationId xmlns:a16="http://schemas.microsoft.com/office/drawing/2014/main" id="{ADB81DC3-47C9-B729-3D32-3CE7A1CA27C9}"/>
+              </a:ext>
+            </a:extLst>
+          </p:cNvPr>
+          <p:cNvPicPr>
+            <a:picLocks noChangeAspect="1"/>
+          </p:cNvPicPr>
+          <p:nvPr/>
+        </p:nvPicPr>
+        <p:blipFill>
+          <a:blip r:embed="rId2"/>
+          <a:stretch>
+            <a:fillRect/>
+          </a:stretch>
+        </p:blipFill>
+        <p:spPr>
+          <a:xfrm>
+            <a:off x="7183437" y="2130425"/>
+            <a:ext cx="4896803" cy="3264535"/>
+          </a:xfrm>
+          <a:prstGeom prst="rect">
+            <a:avLst/>
+          </a:prstGeom>
+        </p:spPr>
+      </p:pic>
     </p:spTree>
     <p:extLst>
       <p:ext uri="{BB962C8B-B14F-4D97-AF65-F5344CB8AC3E}">

</xml_diff>